<commit_message>
fix adl to sync with the adl discussion
</commit_message>
<xml_diff>
--- a/docs/20200825_adl_discussion.pptx
+++ b/docs/20200825_adl_discussion.pptx
@@ -5,7 +5,7 @@
     <p:sldMasterId id="2147483648" r:id="rId1"/>
   </p:sldMasterIdLst>
   <p:notesMasterIdLst>
-    <p:notesMasterId r:id="rId21"/>
+    <p:notesMasterId r:id="rId20"/>
   </p:notesMasterIdLst>
   <p:sldIdLst>
     <p:sldId id="722" r:id="rId2"/>
@@ -26,7 +26,6 @@
     <p:sldId id="743" r:id="rId17"/>
     <p:sldId id="752" r:id="rId18"/>
     <p:sldId id="749" r:id="rId19"/>
-    <p:sldId id="745" r:id="rId20"/>
   </p:sldIdLst>
   <p:sldSz cx="12192000" cy="6858000"/>
   <p:notesSz cx="6858000" cy="9144000"/>
@@ -227,7 +226,7 @@
           <a:p>
             <a:fld id="{EB9E38BE-A718-8B4B-B75F-69ACBCFE3ECF}" type="datetimeFigureOut">
               <a:rPr lang="en-US" smtClean="0"/>
-              <a:t>8/26/20</a:t>
+              <a:t>8/28/20</a:t>
             </a:fld>
             <a:endParaRPr lang="en-US"/>
           </a:p>
@@ -568,7 +567,7 @@
     </p:spTree>
     <p:extLst>
       <p:ext uri="{BB962C8B-B14F-4D97-AF65-F5344CB8AC3E}">
-        <p14:creationId xmlns:p14="http://schemas.microsoft.com/office/powerpoint/2010/main" val="4211755397"/>
+        <p14:creationId xmlns:p14="http://schemas.microsoft.com/office/powerpoint/2010/main" val="2745830550"/>
       </p:ext>
     </p:extLst>
   </p:cSld>
@@ -655,7 +654,7 @@
     </p:spTree>
     <p:extLst>
       <p:ext uri="{BB962C8B-B14F-4D97-AF65-F5344CB8AC3E}">
-        <p14:creationId xmlns:p14="http://schemas.microsoft.com/office/powerpoint/2010/main" val="1056662971"/>
+        <p14:creationId xmlns:p14="http://schemas.microsoft.com/office/powerpoint/2010/main" val="2595510558"/>
       </p:ext>
     </p:extLst>
   </p:cSld>
@@ -739,7 +738,7 @@
     </p:spTree>
     <p:extLst>
       <p:ext uri="{BB962C8B-B14F-4D97-AF65-F5344CB8AC3E}">
-        <p14:creationId xmlns:p14="http://schemas.microsoft.com/office/powerpoint/2010/main" val="3490267079"/>
+        <p14:creationId xmlns:p14="http://schemas.microsoft.com/office/powerpoint/2010/main" val="3575063558"/>
       </p:ext>
     </p:extLst>
   </p:cSld>
@@ -832,7 +831,7 @@
     </p:spTree>
     <p:extLst>
       <p:ext uri="{BB962C8B-B14F-4D97-AF65-F5344CB8AC3E}">
-        <p14:creationId xmlns:p14="http://schemas.microsoft.com/office/powerpoint/2010/main" val="2555730856"/>
+        <p14:creationId xmlns:p14="http://schemas.microsoft.com/office/powerpoint/2010/main" val="2645470119"/>
       </p:ext>
     </p:extLst>
   </p:cSld>
@@ -939,7 +938,7 @@
     </p:spTree>
     <p:extLst>
       <p:ext uri="{BB962C8B-B14F-4D97-AF65-F5344CB8AC3E}">
-        <p14:creationId xmlns:p14="http://schemas.microsoft.com/office/powerpoint/2010/main" val="2895556169"/>
+        <p14:creationId xmlns:p14="http://schemas.microsoft.com/office/powerpoint/2010/main" val="1245878446"/>
       </p:ext>
     </p:extLst>
   </p:cSld>
@@ -1023,7 +1022,7 @@
     </p:spTree>
     <p:extLst>
       <p:ext uri="{BB962C8B-B14F-4D97-AF65-F5344CB8AC3E}">
-        <p14:creationId xmlns:p14="http://schemas.microsoft.com/office/powerpoint/2010/main" val="1732727916"/>
+        <p14:creationId xmlns:p14="http://schemas.microsoft.com/office/powerpoint/2010/main" val="1910494228"/>
       </p:ext>
     </p:extLst>
   </p:cSld>
@@ -1100,17 +1099,14 @@
           <a:p>
             <a:r>
               <a:rPr lang="en-US" dirty="0"/>
-              <a:t>Precision, Data types, Value Range, Sparsity</a:t>
-            </a:r>
-          </a:p>
-          <a:p>
-            <a:r>
-              <a:rPr lang="en-US" dirty="0"/>
-              <a:t>Communication nodes may complicate?</a:t>
-            </a:r>
-          </a:p>
-          <a:p>
-            <a:endParaRPr lang="en-US" dirty="0"/>
+              <a:t>Precision, Data types, Value Range</a:t>
+            </a:r>
+          </a:p>
+          <a:p>
+            <a:r>
+              <a:rPr lang="en-US" dirty="0"/>
+              <a:t>Sparsity?</a:t>
+            </a:r>
           </a:p>
         </p:txBody>
       </p:sp>
@@ -1140,7 +1136,7 @@
     </p:spTree>
     <p:extLst>
       <p:ext uri="{BB962C8B-B14F-4D97-AF65-F5344CB8AC3E}">
-        <p14:creationId xmlns:p14="http://schemas.microsoft.com/office/powerpoint/2010/main" val="628350770"/>
+        <p14:creationId xmlns:p14="http://schemas.microsoft.com/office/powerpoint/2010/main" val="2486185831"/>
       </p:ext>
     </p:extLst>
   </p:cSld>
@@ -1224,7 +1220,7 @@
     </p:spTree>
     <p:extLst>
       <p:ext uri="{BB962C8B-B14F-4D97-AF65-F5344CB8AC3E}">
-        <p14:creationId xmlns:p14="http://schemas.microsoft.com/office/powerpoint/2010/main" val="3217050993"/>
+        <p14:creationId xmlns:p14="http://schemas.microsoft.com/office/powerpoint/2010/main" val="3131172887"/>
       </p:ext>
     </p:extLst>
   </p:cSld>
@@ -1308,7 +1304,7 @@
     </p:spTree>
     <p:extLst>
       <p:ext uri="{BB962C8B-B14F-4D97-AF65-F5344CB8AC3E}">
-        <p14:creationId xmlns:p14="http://schemas.microsoft.com/office/powerpoint/2010/main" val="423603090"/>
+        <p14:creationId xmlns:p14="http://schemas.microsoft.com/office/powerpoint/2010/main" val="4100473544"/>
       </p:ext>
     </p:extLst>
   </p:cSld>
@@ -1416,91 +1412,7 @@
     </p:spTree>
     <p:extLst>
       <p:ext uri="{BB962C8B-B14F-4D97-AF65-F5344CB8AC3E}">
-        <p14:creationId xmlns:p14="http://schemas.microsoft.com/office/powerpoint/2010/main" val="538822807"/>
-      </p:ext>
-    </p:extLst>
-  </p:cSld>
-  <p:clrMapOvr>
-    <a:masterClrMapping/>
-  </p:clrMapOvr>
-</p:notes>
-</file>
-
-<file path=ppt/notesSlides/notesSlide19.xml><?xml version="1.0" encoding="utf-8"?>
-<p:notes xmlns:a="http://schemas.openxmlformats.org/drawingml/2006/main" xmlns:r="http://schemas.openxmlformats.org/officeDocument/2006/relationships" xmlns:p="http://schemas.openxmlformats.org/presentationml/2006/main">
-  <p:cSld>
-    <p:spTree>
-      <p:nvGrpSpPr>
-        <p:cNvPr id="1" name=""/>
-        <p:cNvGrpSpPr/>
-        <p:nvPr/>
-      </p:nvGrpSpPr>
-      <p:grpSpPr>
-        <a:xfrm>
-          <a:off x="0" y="0"/>
-          <a:ext cx="0" cy="0"/>
-          <a:chOff x="0" y="0"/>
-          <a:chExt cx="0" cy="0"/>
-        </a:xfrm>
-      </p:grpSpPr>
-      <p:sp>
-        <p:nvSpPr>
-          <p:cNvPr id="2" name="Slide Image Placeholder 1"/>
-          <p:cNvSpPr>
-            <a:spLocks noGrp="1" noRot="1" noChangeAspect="1"/>
-          </p:cNvSpPr>
-          <p:nvPr>
-            <p:ph type="sldImg"/>
-          </p:nvPr>
-        </p:nvSpPr>
-        <p:spPr/>
-      </p:sp>
-      <p:sp>
-        <p:nvSpPr>
-          <p:cNvPr id="3" name="Notes Placeholder 2"/>
-          <p:cNvSpPr>
-            <a:spLocks noGrp="1"/>
-          </p:cNvSpPr>
-          <p:nvPr>
-            <p:ph type="body" idx="1"/>
-          </p:nvPr>
-        </p:nvSpPr>
-        <p:spPr/>
-        <p:txBody>
-          <a:bodyPr/>
-          <a:lstStyle/>
-          <a:p>
-            <a:endParaRPr lang="en-US" dirty="0"/>
-          </a:p>
-        </p:txBody>
-      </p:sp>
-      <p:sp>
-        <p:nvSpPr>
-          <p:cNvPr id="4" name="Slide Number Placeholder 3"/>
-          <p:cNvSpPr>
-            <a:spLocks noGrp="1"/>
-          </p:cNvSpPr>
-          <p:nvPr>
-            <p:ph type="sldNum" sz="quarter" idx="5"/>
-          </p:nvPr>
-        </p:nvSpPr>
-        <p:spPr/>
-        <p:txBody>
-          <a:bodyPr/>
-          <a:lstStyle/>
-          <a:p>
-            <a:fld id="{04C6BD14-B8FB-4132-90DE-3A4A99E251C2}" type="slidenum">
-              <a:rPr lang="en-US" smtClean="0"/>
-              <a:t>19</a:t>
-            </a:fld>
-            <a:endParaRPr lang="en-US"/>
-          </a:p>
-        </p:txBody>
-      </p:sp>
-    </p:spTree>
-    <p:extLst>
-      <p:ext uri="{BB962C8B-B14F-4D97-AF65-F5344CB8AC3E}">
-        <p14:creationId xmlns:p14="http://schemas.microsoft.com/office/powerpoint/2010/main" val="769968568"/>
+        <p14:creationId xmlns:p14="http://schemas.microsoft.com/office/powerpoint/2010/main" val="328340159"/>
       </p:ext>
     </p:extLst>
   </p:cSld>
@@ -1584,7 +1496,7 @@
     </p:spTree>
     <p:extLst>
       <p:ext uri="{BB962C8B-B14F-4D97-AF65-F5344CB8AC3E}">
-        <p14:creationId xmlns:p14="http://schemas.microsoft.com/office/powerpoint/2010/main" val="2040093272"/>
+        <p14:creationId xmlns:p14="http://schemas.microsoft.com/office/powerpoint/2010/main" val="1163801392"/>
       </p:ext>
     </p:extLst>
   </p:cSld>
@@ -1668,7 +1580,7 @@
     </p:spTree>
     <p:extLst>
       <p:ext uri="{BB962C8B-B14F-4D97-AF65-F5344CB8AC3E}">
-        <p14:creationId xmlns:p14="http://schemas.microsoft.com/office/powerpoint/2010/main" val="1861174630"/>
+        <p14:creationId xmlns:p14="http://schemas.microsoft.com/office/powerpoint/2010/main" val="1228234379"/>
       </p:ext>
     </p:extLst>
   </p:cSld>
@@ -1752,7 +1664,7 @@
     </p:spTree>
     <p:extLst>
       <p:ext uri="{BB962C8B-B14F-4D97-AF65-F5344CB8AC3E}">
-        <p14:creationId xmlns:p14="http://schemas.microsoft.com/office/powerpoint/2010/main" val="3917644372"/>
+        <p14:creationId xmlns:p14="http://schemas.microsoft.com/office/powerpoint/2010/main" val="1615901310"/>
       </p:ext>
     </p:extLst>
   </p:cSld>
@@ -1836,7 +1748,7 @@
     </p:spTree>
     <p:extLst>
       <p:ext uri="{BB962C8B-B14F-4D97-AF65-F5344CB8AC3E}">
-        <p14:creationId xmlns:p14="http://schemas.microsoft.com/office/powerpoint/2010/main" val="2776623913"/>
+        <p14:creationId xmlns:p14="http://schemas.microsoft.com/office/powerpoint/2010/main" val="1237888712"/>
       </p:ext>
     </p:extLst>
   </p:cSld>
@@ -1920,7 +1832,7 @@
     </p:spTree>
     <p:extLst>
       <p:ext uri="{BB962C8B-B14F-4D97-AF65-F5344CB8AC3E}">
-        <p14:creationId xmlns:p14="http://schemas.microsoft.com/office/powerpoint/2010/main" val="1234118751"/>
+        <p14:creationId xmlns:p14="http://schemas.microsoft.com/office/powerpoint/2010/main" val="3676758421"/>
       </p:ext>
     </p:extLst>
   </p:cSld>
@@ -2004,7 +1916,7 @@
     </p:spTree>
     <p:extLst>
       <p:ext uri="{BB962C8B-B14F-4D97-AF65-F5344CB8AC3E}">
-        <p14:creationId xmlns:p14="http://schemas.microsoft.com/office/powerpoint/2010/main" val="1639835740"/>
+        <p14:creationId xmlns:p14="http://schemas.microsoft.com/office/powerpoint/2010/main" val="958046836"/>
       </p:ext>
     </p:extLst>
   </p:cSld>
@@ -2088,7 +2000,7 @@
     </p:spTree>
     <p:extLst>
       <p:ext uri="{BB962C8B-B14F-4D97-AF65-F5344CB8AC3E}">
-        <p14:creationId xmlns:p14="http://schemas.microsoft.com/office/powerpoint/2010/main" val="2542293400"/>
+        <p14:creationId xmlns:p14="http://schemas.microsoft.com/office/powerpoint/2010/main" val="1873848977"/>
       </p:ext>
     </p:extLst>
   </p:cSld>
@@ -2185,7 +2097,7 @@
     </p:spTree>
     <p:extLst>
       <p:ext uri="{BB962C8B-B14F-4D97-AF65-F5344CB8AC3E}">
-        <p14:creationId xmlns:p14="http://schemas.microsoft.com/office/powerpoint/2010/main" val="1814363902"/>
+        <p14:creationId xmlns:p14="http://schemas.microsoft.com/office/powerpoint/2010/main" val="3907220864"/>
       </p:ext>
     </p:extLst>
   </p:cSld>
@@ -2342,7 +2254,7 @@
           <a:p>
             <a:fld id="{B65EEB37-681C-3F48-AA16-C576CAB6D4F1}" type="datetimeFigureOut">
               <a:rPr lang="en-US" smtClean="0"/>
-              <a:t>8/26/20</a:t>
+              <a:t>8/28/20</a:t>
             </a:fld>
             <a:endParaRPr lang="en-US"/>
           </a:p>
@@ -2540,7 +2452,7 @@
           <a:p>
             <a:fld id="{B65EEB37-681C-3F48-AA16-C576CAB6D4F1}" type="datetimeFigureOut">
               <a:rPr lang="en-US" smtClean="0"/>
-              <a:t>8/26/20</a:t>
+              <a:t>8/28/20</a:t>
             </a:fld>
             <a:endParaRPr lang="en-US"/>
           </a:p>
@@ -2748,7 +2660,7 @@
           <a:p>
             <a:fld id="{B65EEB37-681C-3F48-AA16-C576CAB6D4F1}" type="datetimeFigureOut">
               <a:rPr lang="en-US" smtClean="0"/>
-              <a:t>8/26/20</a:t>
+              <a:t>8/28/20</a:t>
             </a:fld>
             <a:endParaRPr lang="en-US"/>
           </a:p>
@@ -2946,7 +2858,7 @@
           <a:p>
             <a:fld id="{B65EEB37-681C-3F48-AA16-C576CAB6D4F1}" type="datetimeFigureOut">
               <a:rPr lang="en-US" smtClean="0"/>
-              <a:t>8/26/20</a:t>
+              <a:t>8/28/20</a:t>
             </a:fld>
             <a:endParaRPr lang="en-US"/>
           </a:p>
@@ -3221,7 +3133,7 @@
           <a:p>
             <a:fld id="{B65EEB37-681C-3F48-AA16-C576CAB6D4F1}" type="datetimeFigureOut">
               <a:rPr lang="en-US" smtClean="0"/>
-              <a:t>8/26/20</a:t>
+              <a:t>8/28/20</a:t>
             </a:fld>
             <a:endParaRPr lang="en-US"/>
           </a:p>
@@ -3486,7 +3398,7 @@
           <a:p>
             <a:fld id="{B65EEB37-681C-3F48-AA16-C576CAB6D4F1}" type="datetimeFigureOut">
               <a:rPr lang="en-US" smtClean="0"/>
-              <a:t>8/26/20</a:t>
+              <a:t>8/28/20</a:t>
             </a:fld>
             <a:endParaRPr lang="en-US"/>
           </a:p>
@@ -3898,7 +3810,7 @@
           <a:p>
             <a:fld id="{B65EEB37-681C-3F48-AA16-C576CAB6D4F1}" type="datetimeFigureOut">
               <a:rPr lang="en-US" smtClean="0"/>
-              <a:t>8/26/20</a:t>
+              <a:t>8/28/20</a:t>
             </a:fld>
             <a:endParaRPr lang="en-US"/>
           </a:p>
@@ -4039,7 +3951,7 @@
           <a:p>
             <a:fld id="{B65EEB37-681C-3F48-AA16-C576CAB6D4F1}" type="datetimeFigureOut">
               <a:rPr lang="en-US" smtClean="0"/>
-              <a:t>8/26/20</a:t>
+              <a:t>8/28/20</a:t>
             </a:fld>
             <a:endParaRPr lang="en-US"/>
           </a:p>
@@ -4152,7 +4064,7 @@
           <a:p>
             <a:fld id="{B65EEB37-681C-3F48-AA16-C576CAB6D4F1}" type="datetimeFigureOut">
               <a:rPr lang="en-US" smtClean="0"/>
-              <a:t>8/26/20</a:t>
+              <a:t>8/28/20</a:t>
             </a:fld>
             <a:endParaRPr lang="en-US"/>
           </a:p>
@@ -4463,7 +4375,7 @@
           <a:p>
             <a:fld id="{B65EEB37-681C-3F48-AA16-C576CAB6D4F1}" type="datetimeFigureOut">
               <a:rPr lang="en-US" smtClean="0"/>
-              <a:t>8/26/20</a:t>
+              <a:t>8/28/20</a:t>
             </a:fld>
             <a:endParaRPr lang="en-US"/>
           </a:p>
@@ -4751,7 +4663,7 @@
           <a:p>
             <a:fld id="{B65EEB37-681C-3F48-AA16-C576CAB6D4F1}" type="datetimeFigureOut">
               <a:rPr lang="en-US" smtClean="0"/>
-              <a:t>8/26/20</a:t>
+              <a:t>8/28/20</a:t>
             </a:fld>
             <a:endParaRPr lang="en-US"/>
           </a:p>
@@ -4992,7 +4904,7 @@
           <a:p>
             <a:fld id="{B65EEB37-681C-3F48-AA16-C576CAB6D4F1}" type="datetimeFigureOut">
               <a:rPr lang="en-US" smtClean="0"/>
-              <a:t>8/26/20</a:t>
+              <a:t>8/28/20</a:t>
             </a:fld>
             <a:endParaRPr lang="en-US"/>
           </a:p>
@@ -5529,7 +5441,7 @@
     </p:spTree>
     <p:extLst>
       <p:ext uri="{BB962C8B-B14F-4D97-AF65-F5344CB8AC3E}">
-        <p14:creationId xmlns:p14="http://schemas.microsoft.com/office/powerpoint/2010/main" val="2501944059"/>
+        <p14:creationId xmlns:p14="http://schemas.microsoft.com/office/powerpoint/2010/main" val="3066979046"/>
       </p:ext>
     </p:extLst>
   </p:cSld>
@@ -6546,7 +6458,7 @@
     </p:spTree>
     <p:extLst>
       <p:ext uri="{BB962C8B-B14F-4D97-AF65-F5344CB8AC3E}">
-        <p14:creationId xmlns:p14="http://schemas.microsoft.com/office/powerpoint/2010/main" val="2868942986"/>
+        <p14:creationId xmlns:p14="http://schemas.microsoft.com/office/powerpoint/2010/main" val="3417807410"/>
       </p:ext>
     </p:extLst>
   </p:cSld>
@@ -7519,7 +7431,7 @@
     </p:spTree>
     <p:extLst>
       <p:ext uri="{BB962C8B-B14F-4D97-AF65-F5344CB8AC3E}">
-        <p14:creationId xmlns:p14="http://schemas.microsoft.com/office/powerpoint/2010/main" val="4099091588"/>
+        <p14:creationId xmlns:p14="http://schemas.microsoft.com/office/powerpoint/2010/main" val="3930066867"/>
       </p:ext>
     </p:extLst>
   </p:cSld>
@@ -8551,7 +8463,7 @@
     </p:spTree>
     <p:extLst>
       <p:ext uri="{BB962C8B-B14F-4D97-AF65-F5344CB8AC3E}">
-        <p14:creationId xmlns:p14="http://schemas.microsoft.com/office/powerpoint/2010/main" val="1671229698"/>
+        <p14:creationId xmlns:p14="http://schemas.microsoft.com/office/powerpoint/2010/main" val="3202234068"/>
       </p:ext>
     </p:extLst>
   </p:cSld>
@@ -9572,7 +9484,7 @@
     </p:spTree>
     <p:extLst>
       <p:ext uri="{BB962C8B-B14F-4D97-AF65-F5344CB8AC3E}">
-        <p14:creationId xmlns:p14="http://schemas.microsoft.com/office/powerpoint/2010/main" val="3120377727"/>
+        <p14:creationId xmlns:p14="http://schemas.microsoft.com/office/powerpoint/2010/main" val="2752848471"/>
       </p:ext>
     </p:extLst>
   </p:cSld>
@@ -10507,7 +10419,7 @@
     </p:spTree>
     <p:extLst>
       <p:ext uri="{BB962C8B-B14F-4D97-AF65-F5344CB8AC3E}">
-        <p14:creationId xmlns:p14="http://schemas.microsoft.com/office/powerpoint/2010/main" val="3899356084"/>
+        <p14:creationId xmlns:p14="http://schemas.microsoft.com/office/powerpoint/2010/main" val="1703350654"/>
       </p:ext>
     </p:extLst>
   </p:cSld>
@@ -11566,7 +11478,7 @@
     </p:spTree>
     <p:extLst>
       <p:ext uri="{BB962C8B-B14F-4D97-AF65-F5344CB8AC3E}">
-        <p14:creationId xmlns:p14="http://schemas.microsoft.com/office/powerpoint/2010/main" val="2672863644"/>
+        <p14:creationId xmlns:p14="http://schemas.microsoft.com/office/powerpoint/2010/main" val="346912330"/>
       </p:ext>
     </p:extLst>
   </p:cSld>
@@ -12104,7 +12016,7 @@
     </p:spTree>
     <p:extLst>
       <p:ext uri="{BB962C8B-B14F-4D97-AF65-F5344CB8AC3E}">
-        <p14:creationId xmlns:p14="http://schemas.microsoft.com/office/powerpoint/2010/main" val="3176593869"/>
+        <p14:creationId xmlns:p14="http://schemas.microsoft.com/office/powerpoint/2010/main" val="3830205298"/>
       </p:ext>
     </p:extLst>
   </p:cSld>
@@ -12706,7 +12618,7 @@
     </p:spTree>
     <p:extLst>
       <p:ext uri="{BB962C8B-B14F-4D97-AF65-F5344CB8AC3E}">
-        <p14:creationId xmlns:p14="http://schemas.microsoft.com/office/powerpoint/2010/main" val="3126169101"/>
+        <p14:creationId xmlns:p14="http://schemas.microsoft.com/office/powerpoint/2010/main" val="3361376971"/>
       </p:ext>
     </p:extLst>
   </p:cSld>
@@ -13029,7 +12941,7 @@
             </a:r>
             <a:r>
               <a:rPr lang="en-US" dirty="0" err="1"/>
-              <a:t>bus.set_communication_type</a:t>
+              <a:t>bus.set_comm_type</a:t>
             </a:r>
             <a:r>
               <a:rPr lang="en-US" dirty="0"/>
@@ -13170,7 +13082,7 @@
         <p:spPr>
           <a:xfrm>
             <a:off x="289654" y="906602"/>
-            <a:ext cx="7156174" cy="369332"/>
+            <a:ext cx="6559720" cy="369332"/>
           </a:xfrm>
           <a:prstGeom prst="rect">
             <a:avLst/>
@@ -13222,7 +13134,7 @@
         <p:spPr>
           <a:xfrm>
             <a:off x="289653" y="1868501"/>
-            <a:ext cx="7156175" cy="2585325"/>
+            <a:ext cx="6559721" cy="2585325"/>
           </a:xfrm>
           <a:prstGeom prst="rect">
             <a:avLst/>
@@ -13349,8 +13261,8 @@
         </p:nvSpPr>
         <p:spPr>
           <a:xfrm>
-            <a:off x="7742712" y="841414"/>
-            <a:ext cx="4430034" cy="503023"/>
+            <a:off x="7742712" y="872191"/>
+            <a:ext cx="4430034" cy="441468"/>
           </a:xfrm>
           <a:prstGeom prst="rect">
             <a:avLst/>
@@ -13383,7 +13295,7 @@
           <a:p>
             <a:pPr defTabSz="410751" hangingPunct="0"/>
             <a:r>
-              <a:rPr lang="en-US" sz="2800" b="1" dirty="0">
+              <a:rPr lang="en-US" sz="2400" b="1" dirty="0">
                 <a:ea typeface="Calibri" charset="0"/>
                 <a:cs typeface="Calibri" charset="0"/>
               </a:rPr>
@@ -13406,8 +13318,8 @@
         </p:nvSpPr>
         <p:spPr>
           <a:xfrm>
-            <a:off x="7742712" y="2771151"/>
-            <a:ext cx="4430034" cy="503023"/>
+            <a:off x="7742712" y="2801928"/>
+            <a:ext cx="4430034" cy="441468"/>
           </a:xfrm>
           <a:prstGeom prst="rect">
             <a:avLst/>
@@ -13440,7 +13352,7 @@
           <a:p>
             <a:pPr defTabSz="410751" hangingPunct="0"/>
             <a:r>
-              <a:rPr lang="en-US" sz="2800" b="1" dirty="0">
+              <a:rPr lang="en-US" sz="2400" b="1" dirty="0">
                 <a:ea typeface="Calibri" charset="0"/>
                 <a:cs typeface="Calibri" charset="0"/>
               </a:rPr>
@@ -13452,7 +13364,7 @@
     </p:spTree>
     <p:extLst>
       <p:ext uri="{BB962C8B-B14F-4D97-AF65-F5344CB8AC3E}">
-        <p14:creationId xmlns:p14="http://schemas.microsoft.com/office/powerpoint/2010/main" val="3302575830"/>
+        <p14:creationId xmlns:p14="http://schemas.microsoft.com/office/powerpoint/2010/main" val="1021451198"/>
       </p:ext>
     </p:extLst>
   </p:cSld>
@@ -13596,7 +13508,7 @@
 </p:sld>
 </file>
 
-<file path=ppt/slides/slide19.xml><?xml version="1.0" encoding="utf-8"?>
+<file path=ppt/slides/slide2.xml><?xml version="1.0" encoding="utf-8"?>
 <p:sld xmlns:a="http://schemas.openxmlformats.org/drawingml/2006/main" xmlns:r="http://schemas.openxmlformats.org/officeDocument/2006/relationships" xmlns:p="http://schemas.openxmlformats.org/presentationml/2006/main">
   <p:cSld>
     <p:spTree>
@@ -13642,7 +13554,110 @@
           <a:p>
             <a:r>
               <a:rPr lang="en-US" sz="2800" b="1" dirty="0"/>
-              <a:t>Hardware Architecture Graph (HAG)</a:t>
+              <a:t>Abstraction of Deep Learning Accelerators</a:t>
+            </a:r>
+          </a:p>
+        </p:txBody>
+      </p:sp>
+      <p:sp>
+        <p:nvSpPr>
+          <p:cNvPr id="71" name="TextBox 70">
+            <a:extLst>
+              <a:ext uri="{FF2B5EF4-FFF2-40B4-BE49-F238E27FC236}">
+                <a16:creationId xmlns:a16="http://schemas.microsoft.com/office/drawing/2014/main" id="{E72A4E69-D05A-8B48-89BD-BC8FDD578ABF}"/>
+              </a:ext>
+            </a:extLst>
+          </p:cNvPr>
+          <p:cNvSpPr txBox="1"/>
+          <p:nvPr/>
+        </p:nvSpPr>
+        <p:spPr>
+          <a:xfrm>
+            <a:off x="1429472" y="5465868"/>
+            <a:ext cx="8969828" cy="830997"/>
+          </a:xfrm>
+          <a:prstGeom prst="rect">
+            <a:avLst/>
+          </a:prstGeom>
+          <a:noFill/>
+        </p:spPr>
+        <p:txBody>
+          <a:bodyPr wrap="none" rtlCol="0">
+            <a:spAutoFit/>
+          </a:bodyPr>
+          <a:lstStyle/>
+          <a:p>
+            <a:pPr algn="ctr"/>
+            <a:r>
+              <a:rPr lang="en-US" sz="2400" b="1" dirty="0">
+                <a:solidFill>
+                  <a:srgbClr val="4041FF"/>
+                </a:solidFill>
+              </a:rPr>
+              <a:t>Accelerators</a:t>
+            </a:r>
+            <a:r>
+              <a:rPr lang="en-US" sz="2400" dirty="0"/>
+              <a:t> are comprised of:</a:t>
+            </a:r>
+          </a:p>
+          <a:p>
+            <a:pPr algn="ctr"/>
+            <a:r>
+              <a:rPr lang="en-US" sz="2400" b="1" dirty="0">
+                <a:solidFill>
+                  <a:srgbClr val="00B050"/>
+                </a:solidFill>
+              </a:rPr>
+              <a:t>Compute</a:t>
+            </a:r>
+            <a:r>
+              <a:rPr lang="en-US" sz="2400" dirty="0">
+                <a:solidFill>
+                  <a:schemeClr val="bg1"/>
+                </a:solidFill>
+              </a:rPr>
+              <a:t>, </a:t>
+            </a:r>
+            <a:r>
+              <a:rPr lang="en-US" sz="2400" b="1" dirty="0">
+                <a:solidFill>
+                  <a:schemeClr val="bg1"/>
+                </a:solidFill>
+              </a:rPr>
+              <a:t>Storage</a:t>
+            </a:r>
+            <a:r>
+              <a:rPr lang="en-US" sz="2400" dirty="0">
+                <a:solidFill>
+                  <a:schemeClr val="bg1"/>
+                </a:solidFill>
+              </a:rPr>
+              <a:t>, </a:t>
+            </a:r>
+            <a:r>
+              <a:rPr lang="en-US" sz="2400" b="1" dirty="0">
+                <a:solidFill>
+                  <a:schemeClr val="bg1"/>
+                </a:solidFill>
+              </a:rPr>
+              <a:t>On-chip Communication</a:t>
+            </a:r>
+            <a:r>
+              <a:rPr lang="en-US" sz="2400" dirty="0">
+                <a:solidFill>
+                  <a:schemeClr val="bg1"/>
+                </a:solidFill>
+              </a:rPr>
+              <a:t>, </a:t>
+            </a:r>
+            <a:r>
+              <a:rPr lang="en-US" sz="2400" b="1" dirty="0">
+                <a:solidFill>
+                  <a:schemeClr val="bg1"/>
+                </a:solidFill>
+              </a:rPr>
+              <a:t>Off-chip Communication</a:t>
             </a:r>
           </a:p>
         </p:txBody>
@@ -13675,7 +13690,7 @@
           <a:p>
             <a:fld id="{4C8C6190-CC26-854B-999A-5802CBDE89CB}" type="slidenum">
               <a:rPr lang="en-US" smtClean="0"/>
-              <a:t>19</a:t>
+              <a:t>2</a:t>
             </a:fld>
             <a:endParaRPr lang="en-US" dirty="0"/>
           </a:p>
@@ -13683,568 +13698,10 @@
       </p:sp>
       <p:sp>
         <p:nvSpPr>
-          <p:cNvPr id="7" name="Rectangle 6">
-            <a:extLst>
-              <a:ext uri="{FF2B5EF4-FFF2-40B4-BE49-F238E27FC236}">
-                <a16:creationId xmlns:a16="http://schemas.microsoft.com/office/drawing/2014/main" id="{F8D7DE11-3BE3-5C4F-98D6-CCFF98AC121C}"/>
-              </a:ext>
-            </a:extLst>
-          </p:cNvPr>
-          <p:cNvSpPr/>
-          <p:nvPr/>
-        </p:nvSpPr>
-        <p:spPr>
-          <a:xfrm>
-            <a:off x="5168900" y="698500"/>
-            <a:ext cx="3360600" cy="4699001"/>
-          </a:xfrm>
-          <a:prstGeom prst="rect">
-            <a:avLst/>
-          </a:prstGeom>
-          <a:noFill/>
-          <a:ln w="38100">
-            <a:solidFill>
-              <a:schemeClr val="tx1"/>
-            </a:solidFill>
-          </a:ln>
-        </p:spPr>
-        <p:style>
-          <a:lnRef idx="2">
-            <a:schemeClr val="accent1">
-              <a:shade val="50000"/>
-            </a:schemeClr>
-          </a:lnRef>
-          <a:fillRef idx="1">
-            <a:schemeClr val="accent1"/>
-          </a:fillRef>
-          <a:effectRef idx="0">
-            <a:schemeClr val="accent1"/>
-          </a:effectRef>
-          <a:fontRef idx="minor">
-            <a:schemeClr val="lt1"/>
-          </a:fontRef>
-        </p:style>
-        <p:txBody>
-          <a:bodyPr rtlCol="0" anchor="t" anchorCtr="0"/>
-          <a:lstStyle/>
-          <a:p>
-            <a:r>
-              <a:rPr lang="en-US" b="1" u="sng" dirty="0">
-                <a:solidFill>
-                  <a:schemeClr val="tx1"/>
-                </a:solidFill>
-              </a:rPr>
-              <a:t>DNN Accelerator</a:t>
-            </a:r>
-          </a:p>
-        </p:txBody>
-      </p:sp>
-      <p:sp>
-        <p:nvSpPr>
-          <p:cNvPr id="8" name="Rectangle 7">
-            <a:extLst>
-              <a:ext uri="{FF2B5EF4-FFF2-40B4-BE49-F238E27FC236}">
-                <a16:creationId xmlns:a16="http://schemas.microsoft.com/office/drawing/2014/main" id="{28A12591-5C1E-1348-A2E9-583E653AD1DE}"/>
-              </a:ext>
-            </a:extLst>
-          </p:cNvPr>
-          <p:cNvSpPr/>
-          <p:nvPr/>
-        </p:nvSpPr>
-        <p:spPr>
-          <a:xfrm>
-            <a:off x="4253476" y="1750756"/>
-            <a:ext cx="648724" cy="2977392"/>
-          </a:xfrm>
-          <a:prstGeom prst="rect">
-            <a:avLst/>
-          </a:prstGeom>
-          <a:solidFill>
-            <a:schemeClr val="accent6">
-              <a:lumMod val="40000"/>
-              <a:lumOff val="60000"/>
-            </a:schemeClr>
-          </a:solidFill>
-          <a:ln w="38100">
-            <a:solidFill>
-              <a:schemeClr val="tx1"/>
-            </a:solidFill>
-          </a:ln>
-        </p:spPr>
-        <p:style>
-          <a:lnRef idx="2">
-            <a:schemeClr val="accent1">
-              <a:shade val="50000"/>
-            </a:schemeClr>
-          </a:lnRef>
-          <a:fillRef idx="1">
-            <a:schemeClr val="accent1"/>
-          </a:fillRef>
-          <a:effectRef idx="0">
-            <a:schemeClr val="accent1"/>
-          </a:effectRef>
-          <a:fontRef idx="minor">
-            <a:schemeClr val="lt1"/>
-          </a:fontRef>
-        </p:style>
-        <p:txBody>
-          <a:bodyPr rtlCol="0" anchor="ctr"/>
-          <a:lstStyle/>
-          <a:p>
-            <a:pPr algn="ctr"/>
-            <a:r>
-              <a:rPr lang="en-US" b="1" dirty="0">
-                <a:solidFill>
-                  <a:schemeClr val="tx1"/>
-                </a:solidFill>
-              </a:rPr>
-              <a:t>Bus</a:t>
-            </a:r>
-          </a:p>
-        </p:txBody>
-      </p:sp>
-      <p:sp>
-        <p:nvSpPr>
-          <p:cNvPr id="9" name="Rectangle 8">
-            <a:extLst>
-              <a:ext uri="{FF2B5EF4-FFF2-40B4-BE49-F238E27FC236}">
-                <a16:creationId xmlns:a16="http://schemas.microsoft.com/office/drawing/2014/main" id="{44E69133-0861-F34B-A2D3-82FDC77CE95B}"/>
-              </a:ext>
-            </a:extLst>
-          </p:cNvPr>
-          <p:cNvSpPr/>
-          <p:nvPr/>
-        </p:nvSpPr>
-        <p:spPr>
-          <a:xfrm>
-            <a:off x="2831076" y="1750756"/>
-            <a:ext cx="1155700" cy="2977392"/>
-          </a:xfrm>
-          <a:prstGeom prst="rect">
-            <a:avLst/>
-          </a:prstGeom>
-          <a:solidFill>
-            <a:schemeClr val="accent5">
-              <a:lumMod val="40000"/>
-              <a:lumOff val="60000"/>
-            </a:schemeClr>
-          </a:solidFill>
-          <a:ln w="38100">
-            <a:solidFill>
-              <a:schemeClr val="tx1"/>
-            </a:solidFill>
-          </a:ln>
-        </p:spPr>
-        <p:style>
-          <a:lnRef idx="2">
-            <a:schemeClr val="accent1">
-              <a:shade val="50000"/>
-            </a:schemeClr>
-          </a:lnRef>
-          <a:fillRef idx="1">
-            <a:schemeClr val="accent1"/>
-          </a:fillRef>
-          <a:effectRef idx="0">
-            <a:schemeClr val="accent1"/>
-          </a:effectRef>
-          <a:fontRef idx="minor">
-            <a:schemeClr val="lt1"/>
-          </a:fontRef>
-        </p:style>
-        <p:txBody>
-          <a:bodyPr rtlCol="0" anchor="ctr"/>
-          <a:lstStyle/>
-          <a:p>
-            <a:pPr algn="ctr"/>
-            <a:r>
-              <a:rPr lang="en-US" b="1" dirty="0">
-                <a:solidFill>
-                  <a:schemeClr val="tx1"/>
-                </a:solidFill>
-              </a:rPr>
-              <a:t>DRAM</a:t>
-            </a:r>
-          </a:p>
-        </p:txBody>
-      </p:sp>
-      <p:sp>
-        <p:nvSpPr>
-          <p:cNvPr id="10" name="Rectangle 9">
-            <a:extLst>
-              <a:ext uri="{FF2B5EF4-FFF2-40B4-BE49-F238E27FC236}">
-                <a16:creationId xmlns:a16="http://schemas.microsoft.com/office/drawing/2014/main" id="{898EA7A4-ADC7-6C48-9557-D8CFC52BB88E}"/>
-              </a:ext>
-            </a:extLst>
-          </p:cNvPr>
-          <p:cNvSpPr/>
-          <p:nvPr/>
-        </p:nvSpPr>
-        <p:spPr>
-          <a:xfrm>
-            <a:off x="6940318" y="1622837"/>
-            <a:ext cx="1141976" cy="484442"/>
-          </a:xfrm>
-          <a:prstGeom prst="rect">
-            <a:avLst/>
-          </a:prstGeom>
-          <a:solidFill>
-            <a:schemeClr val="accent5">
-              <a:lumMod val="40000"/>
-              <a:lumOff val="60000"/>
-            </a:schemeClr>
-          </a:solidFill>
-          <a:ln w="38100">
-            <a:solidFill>
-              <a:schemeClr val="tx1"/>
-            </a:solidFill>
-          </a:ln>
-        </p:spPr>
-        <p:style>
-          <a:lnRef idx="2">
-            <a:schemeClr val="accent1">
-              <a:shade val="50000"/>
-            </a:schemeClr>
-          </a:lnRef>
-          <a:fillRef idx="1">
-            <a:schemeClr val="accent1"/>
-          </a:fillRef>
-          <a:effectRef idx="0">
-            <a:schemeClr val="accent1"/>
-          </a:effectRef>
-          <a:fontRef idx="minor">
-            <a:schemeClr val="lt1"/>
-          </a:fontRef>
-        </p:style>
-        <p:txBody>
-          <a:bodyPr rtlCol="0" anchor="ctr"/>
-          <a:lstStyle/>
-          <a:p>
-            <a:pPr algn="ctr"/>
-            <a:r>
-              <a:rPr lang="en-US" b="1" dirty="0">
-                <a:solidFill>
-                  <a:schemeClr val="tx1"/>
-                </a:solidFill>
-              </a:rPr>
-              <a:t>WBUF</a:t>
-            </a:r>
-          </a:p>
-        </p:txBody>
-      </p:sp>
-      <p:sp>
-        <p:nvSpPr>
-          <p:cNvPr id="11" name="Rectangle 10">
-            <a:extLst>
-              <a:ext uri="{FF2B5EF4-FFF2-40B4-BE49-F238E27FC236}">
-                <a16:creationId xmlns:a16="http://schemas.microsoft.com/office/drawing/2014/main" id="{A428E48E-38C4-1743-B87A-21DF0C5B2FEC}"/>
-              </a:ext>
-            </a:extLst>
-          </p:cNvPr>
-          <p:cNvSpPr/>
-          <p:nvPr/>
-        </p:nvSpPr>
-        <p:spPr>
-          <a:xfrm>
-            <a:off x="5435600" y="1195179"/>
-            <a:ext cx="2832100" cy="2513222"/>
-          </a:xfrm>
-          <a:prstGeom prst="rect">
-            <a:avLst/>
-          </a:prstGeom>
-          <a:noFill/>
-          <a:ln w="38100">
-            <a:solidFill>
-              <a:schemeClr val="tx1"/>
-            </a:solidFill>
-          </a:ln>
-        </p:spPr>
-        <p:style>
-          <a:lnRef idx="2">
-            <a:schemeClr val="accent1">
-              <a:shade val="50000"/>
-            </a:schemeClr>
-          </a:lnRef>
-          <a:fillRef idx="1">
-            <a:schemeClr val="accent1"/>
-          </a:fillRef>
-          <a:effectRef idx="0">
-            <a:schemeClr val="accent1"/>
-          </a:effectRef>
-          <a:fontRef idx="minor">
-            <a:schemeClr val="lt1"/>
-          </a:fontRef>
-        </p:style>
-        <p:txBody>
-          <a:bodyPr rtlCol="0" anchor="t" anchorCtr="0"/>
-          <a:lstStyle/>
-          <a:p>
-            <a:r>
-              <a:rPr lang="en-US" b="1" u="sng" dirty="0">
-                <a:solidFill>
-                  <a:schemeClr val="tx1"/>
-                </a:solidFill>
-              </a:rPr>
-              <a:t>Systolic Array</a:t>
-            </a:r>
-          </a:p>
-        </p:txBody>
-      </p:sp>
-      <p:sp>
-        <p:nvSpPr>
-          <p:cNvPr id="12" name="Rectangle 11">
-            <a:extLst>
-              <a:ext uri="{FF2B5EF4-FFF2-40B4-BE49-F238E27FC236}">
-                <a16:creationId xmlns:a16="http://schemas.microsoft.com/office/drawing/2014/main" id="{903DCB40-5E4D-B243-9129-A3A75038D4AB}"/>
-              </a:ext>
-            </a:extLst>
-          </p:cNvPr>
-          <p:cNvSpPr/>
-          <p:nvPr/>
-        </p:nvSpPr>
-        <p:spPr>
-          <a:xfrm>
-            <a:off x="5435600" y="4017678"/>
-            <a:ext cx="2832100" cy="1102724"/>
-          </a:xfrm>
-          <a:prstGeom prst="rect">
-            <a:avLst/>
-          </a:prstGeom>
-          <a:noFill/>
-          <a:ln w="38100">
-            <a:solidFill>
-              <a:schemeClr val="tx1"/>
-            </a:solidFill>
-          </a:ln>
-        </p:spPr>
-        <p:style>
-          <a:lnRef idx="2">
-            <a:schemeClr val="accent1">
-              <a:shade val="50000"/>
-            </a:schemeClr>
-          </a:lnRef>
-          <a:fillRef idx="1">
-            <a:schemeClr val="accent1"/>
-          </a:fillRef>
-          <a:effectRef idx="0">
-            <a:schemeClr val="accent1"/>
-          </a:effectRef>
-          <a:fontRef idx="minor">
-            <a:schemeClr val="lt1"/>
-          </a:fontRef>
-        </p:style>
-        <p:txBody>
-          <a:bodyPr rtlCol="0" anchor="t" anchorCtr="0"/>
-          <a:lstStyle/>
-          <a:p>
-            <a:r>
-              <a:rPr lang="en-US" b="1" u="sng" dirty="0">
-                <a:solidFill>
-                  <a:schemeClr val="tx1"/>
-                </a:solidFill>
-              </a:rPr>
-              <a:t>SIMD Array</a:t>
-            </a:r>
-          </a:p>
-        </p:txBody>
-      </p:sp>
-      <p:sp>
-        <p:nvSpPr>
-          <p:cNvPr id="13" name="Rectangle 12">
-            <a:extLst>
-              <a:ext uri="{FF2B5EF4-FFF2-40B4-BE49-F238E27FC236}">
-                <a16:creationId xmlns:a16="http://schemas.microsoft.com/office/drawing/2014/main" id="{09838033-AC44-9641-9340-CB034CE9E4A1}"/>
-              </a:ext>
-            </a:extLst>
-          </p:cNvPr>
-          <p:cNvSpPr/>
-          <p:nvPr/>
-        </p:nvSpPr>
-        <p:spPr>
-          <a:xfrm>
-            <a:off x="6940318" y="3043726"/>
-            <a:ext cx="1141976" cy="484442"/>
-          </a:xfrm>
-          <a:prstGeom prst="rect">
-            <a:avLst/>
-          </a:prstGeom>
-          <a:solidFill>
-            <a:schemeClr val="accent5">
-              <a:lumMod val="40000"/>
-              <a:lumOff val="60000"/>
-            </a:schemeClr>
-          </a:solidFill>
-          <a:ln w="38100">
-            <a:solidFill>
-              <a:schemeClr val="tx1"/>
-            </a:solidFill>
-          </a:ln>
-        </p:spPr>
-        <p:style>
-          <a:lnRef idx="2">
-            <a:schemeClr val="accent1">
-              <a:shade val="50000"/>
-            </a:schemeClr>
-          </a:lnRef>
-          <a:fillRef idx="1">
-            <a:schemeClr val="accent1"/>
-          </a:fillRef>
-          <a:effectRef idx="0">
-            <a:schemeClr val="accent1"/>
-          </a:effectRef>
-          <a:fontRef idx="minor">
-            <a:schemeClr val="lt1"/>
-          </a:fontRef>
-        </p:style>
-        <p:txBody>
-          <a:bodyPr rtlCol="0" anchor="ctr"/>
-          <a:lstStyle/>
-          <a:p>
-            <a:pPr algn="ctr"/>
-            <a:r>
-              <a:rPr lang="en-US" b="1" dirty="0">
-                <a:solidFill>
-                  <a:schemeClr val="tx1"/>
-                </a:solidFill>
-              </a:rPr>
-              <a:t>OBUF</a:t>
-            </a:r>
-          </a:p>
-        </p:txBody>
-      </p:sp>
-      <p:sp>
-        <p:nvSpPr>
-          <p:cNvPr id="14" name="Rectangle 13">
-            <a:extLst>
-              <a:ext uri="{FF2B5EF4-FFF2-40B4-BE49-F238E27FC236}">
-                <a16:creationId xmlns:a16="http://schemas.microsoft.com/office/drawing/2014/main" id="{EDB4F3BE-D9CF-EB42-AA19-3C401E2A0838}"/>
-              </a:ext>
-            </a:extLst>
-          </p:cNvPr>
-          <p:cNvSpPr/>
-          <p:nvPr/>
-        </p:nvSpPr>
-        <p:spPr>
-          <a:xfrm>
-            <a:off x="5612936" y="2357463"/>
-            <a:ext cx="1141976" cy="484442"/>
-          </a:xfrm>
-          <a:prstGeom prst="rect">
-            <a:avLst/>
-          </a:prstGeom>
-          <a:solidFill>
-            <a:schemeClr val="accent5">
-              <a:lumMod val="40000"/>
-              <a:lumOff val="60000"/>
-            </a:schemeClr>
-          </a:solidFill>
-          <a:ln w="38100">
-            <a:solidFill>
-              <a:schemeClr val="tx1"/>
-            </a:solidFill>
-          </a:ln>
-        </p:spPr>
-        <p:style>
-          <a:lnRef idx="2">
-            <a:schemeClr val="accent1">
-              <a:shade val="50000"/>
-            </a:schemeClr>
-          </a:lnRef>
-          <a:fillRef idx="1">
-            <a:schemeClr val="accent1"/>
-          </a:fillRef>
-          <a:effectRef idx="0">
-            <a:schemeClr val="accent1"/>
-          </a:effectRef>
-          <a:fontRef idx="minor">
-            <a:schemeClr val="lt1"/>
-          </a:fontRef>
-        </p:style>
-        <p:txBody>
-          <a:bodyPr rtlCol="0" anchor="ctr"/>
-          <a:lstStyle/>
-          <a:p>
-            <a:pPr algn="ctr"/>
-            <a:r>
-              <a:rPr lang="en-US" b="1" dirty="0">
-                <a:solidFill>
-                  <a:schemeClr val="tx1"/>
-                </a:solidFill>
-              </a:rPr>
-              <a:t>IBUF</a:t>
-            </a:r>
-          </a:p>
-        </p:txBody>
-      </p:sp>
-      <p:sp>
-        <p:nvSpPr>
-          <p:cNvPr id="15" name="Rectangle 14">
-            <a:extLst>
-              <a:ext uri="{FF2B5EF4-FFF2-40B4-BE49-F238E27FC236}">
-                <a16:creationId xmlns:a16="http://schemas.microsoft.com/office/drawing/2014/main" id="{62C6106E-9402-CE41-AC6C-84AE012A8257}"/>
-              </a:ext>
-            </a:extLst>
-          </p:cNvPr>
-          <p:cNvSpPr/>
-          <p:nvPr/>
-        </p:nvSpPr>
-        <p:spPr>
-          <a:xfrm>
-            <a:off x="5612936" y="1622837"/>
-            <a:ext cx="1141976" cy="484442"/>
-          </a:xfrm>
-          <a:prstGeom prst="rect">
-            <a:avLst/>
-          </a:prstGeom>
-          <a:solidFill>
-            <a:schemeClr val="accent5">
-              <a:lumMod val="40000"/>
-              <a:lumOff val="60000"/>
-            </a:schemeClr>
-          </a:solidFill>
-          <a:ln w="38100">
-            <a:solidFill>
-              <a:schemeClr val="tx1"/>
-            </a:solidFill>
-          </a:ln>
-        </p:spPr>
-        <p:style>
-          <a:lnRef idx="2">
-            <a:schemeClr val="accent1">
-              <a:shade val="50000"/>
-            </a:schemeClr>
-          </a:lnRef>
-          <a:fillRef idx="1">
-            <a:schemeClr val="accent1"/>
-          </a:fillRef>
-          <a:effectRef idx="0">
-            <a:schemeClr val="accent1"/>
-          </a:effectRef>
-          <a:fontRef idx="minor">
-            <a:schemeClr val="lt1"/>
-          </a:fontRef>
-        </p:style>
-        <p:txBody>
-          <a:bodyPr rtlCol="0" anchor="ctr"/>
-          <a:lstStyle/>
-          <a:p>
-            <a:pPr algn="ctr"/>
-            <a:r>
-              <a:rPr lang="en-US" b="1" dirty="0">
-                <a:solidFill>
-                  <a:schemeClr val="tx1"/>
-                </a:solidFill>
-              </a:rPr>
-              <a:t>BBUF</a:t>
-            </a:r>
-          </a:p>
-        </p:txBody>
-      </p:sp>
-      <p:sp>
-        <p:nvSpPr>
           <p:cNvPr id="16" name="Rectangle 15">
             <a:extLst>
               <a:ext uri="{FF2B5EF4-FFF2-40B4-BE49-F238E27FC236}">
-                <a16:creationId xmlns:a16="http://schemas.microsoft.com/office/drawing/2014/main" id="{B8ACCE0B-0BE9-0D4D-B553-E83B0ABA0D60}"/>
+                <a16:creationId xmlns:a16="http://schemas.microsoft.com/office/drawing/2014/main" id="{00E07FFA-60FB-3548-B882-1562B4E01B16}"/>
               </a:ext>
             </a:extLst>
           </p:cNvPr>
@@ -14305,7 +13762,7 @@
           <p:cNvPr id="17" name="Rectangle 16">
             <a:extLst>
               <a:ext uri="{FF2B5EF4-FFF2-40B4-BE49-F238E27FC236}">
-                <a16:creationId xmlns:a16="http://schemas.microsoft.com/office/drawing/2014/main" id="{79418700-5172-6F46-9B8E-4811AC64C1F1}"/>
+                <a16:creationId xmlns:a16="http://schemas.microsoft.com/office/drawing/2014/main" id="{2A222752-CFE9-1145-83F6-AE412DCED445}"/>
               </a:ext>
             </a:extLst>
           </p:cNvPr>
@@ -14361,1081 +13818,10 @@
           </a:p>
         </p:txBody>
       </p:sp>
-      <p:sp>
-        <p:nvSpPr>
-          <p:cNvPr id="18" name="Rectangle 17">
-            <a:extLst>
-              <a:ext uri="{FF2B5EF4-FFF2-40B4-BE49-F238E27FC236}">
-                <a16:creationId xmlns:a16="http://schemas.microsoft.com/office/drawing/2014/main" id="{B33631CC-2CEB-C64B-984A-D7E8ED346138}"/>
-              </a:ext>
-            </a:extLst>
-          </p:cNvPr>
-          <p:cNvSpPr/>
-          <p:nvPr/>
-        </p:nvSpPr>
-        <p:spPr>
-          <a:xfrm>
-            <a:off x="5612936" y="4428419"/>
-            <a:ext cx="1141976" cy="484442"/>
-          </a:xfrm>
-          <a:prstGeom prst="rect">
-            <a:avLst/>
-          </a:prstGeom>
-          <a:solidFill>
-            <a:schemeClr val="accent5">
-              <a:lumMod val="40000"/>
-              <a:lumOff val="60000"/>
-            </a:schemeClr>
-          </a:solidFill>
-          <a:ln w="38100">
-            <a:solidFill>
-              <a:schemeClr val="tx1"/>
-            </a:solidFill>
-          </a:ln>
-        </p:spPr>
-        <p:style>
-          <a:lnRef idx="2">
-            <a:schemeClr val="accent1">
-              <a:shade val="50000"/>
-            </a:schemeClr>
-          </a:lnRef>
-          <a:fillRef idx="1">
-            <a:schemeClr val="accent1"/>
-          </a:fillRef>
-          <a:effectRef idx="0">
-            <a:schemeClr val="accent1"/>
-          </a:effectRef>
-          <a:fontRef idx="minor">
-            <a:schemeClr val="lt1"/>
-          </a:fontRef>
-        </p:style>
-        <p:txBody>
-          <a:bodyPr rtlCol="0" anchor="ctr"/>
-          <a:lstStyle/>
-          <a:p>
-            <a:pPr algn="ctr"/>
-            <a:r>
-              <a:rPr lang="en-US" b="1" dirty="0">
-                <a:solidFill>
-                  <a:schemeClr val="tx1"/>
-                </a:solidFill>
-              </a:rPr>
-              <a:t>Vector RF</a:t>
-            </a:r>
-          </a:p>
-        </p:txBody>
-      </p:sp>
-      <p:cxnSp>
-        <p:nvCxnSpPr>
-          <p:cNvPr id="19" name="Straight Arrow Connector 18">
-            <a:extLst>
-              <a:ext uri="{FF2B5EF4-FFF2-40B4-BE49-F238E27FC236}">
-                <a16:creationId xmlns:a16="http://schemas.microsoft.com/office/drawing/2014/main" id="{32BBDF64-597F-4C42-8D98-593954A59766}"/>
-              </a:ext>
-            </a:extLst>
-          </p:cNvPr>
-          <p:cNvCxnSpPr>
-            <a:cxnSpLocks/>
-            <a:stCxn id="8" idx="1"/>
-            <a:endCxn id="9" idx="3"/>
-          </p:cNvCxnSpPr>
-          <p:nvPr/>
-        </p:nvCxnSpPr>
-        <p:spPr>
-          <a:xfrm flipH="1">
-            <a:off x="3986776" y="3239452"/>
-            <a:ext cx="266700" cy="0"/>
-          </a:xfrm>
-          <a:prstGeom prst="straightConnector1">
-            <a:avLst/>
-          </a:prstGeom>
-          <a:ln w="38100">
-            <a:solidFill>
-              <a:srgbClr val="C00000"/>
-            </a:solidFill>
-            <a:headEnd type="triangle"/>
-            <a:tailEnd type="triangle"/>
-          </a:ln>
-        </p:spPr>
-        <p:style>
-          <a:lnRef idx="1">
-            <a:schemeClr val="accent1"/>
-          </a:lnRef>
-          <a:fillRef idx="0">
-            <a:schemeClr val="accent1"/>
-          </a:fillRef>
-          <a:effectRef idx="0">
-            <a:schemeClr val="accent1"/>
-          </a:effectRef>
-          <a:fontRef idx="minor">
-            <a:schemeClr val="tx1"/>
-          </a:fontRef>
-        </p:style>
-      </p:cxnSp>
-      <p:cxnSp>
-        <p:nvCxnSpPr>
-          <p:cNvPr id="20" name="Straight Arrow Connector 19">
-            <a:extLst>
-              <a:ext uri="{FF2B5EF4-FFF2-40B4-BE49-F238E27FC236}">
-                <a16:creationId xmlns:a16="http://schemas.microsoft.com/office/drawing/2014/main" id="{7DCFED1E-D42E-ED47-9FB3-67111488BEAF}"/>
-              </a:ext>
-            </a:extLst>
-          </p:cNvPr>
-          <p:cNvCxnSpPr>
-            <a:cxnSpLocks/>
-            <a:stCxn id="15" idx="1"/>
-            <a:endCxn id="8" idx="3"/>
-          </p:cNvCxnSpPr>
-          <p:nvPr/>
-        </p:nvCxnSpPr>
-        <p:spPr>
-          <a:xfrm flipH="1">
-            <a:off x="4902200" y="1865058"/>
-            <a:ext cx="710736" cy="1374394"/>
-          </a:xfrm>
-          <a:prstGeom prst="straightConnector1">
-            <a:avLst/>
-          </a:prstGeom>
-          <a:ln w="38100">
-            <a:solidFill>
-              <a:srgbClr val="C00000"/>
-            </a:solidFill>
-            <a:headEnd type="triangle"/>
-            <a:tailEnd type="none"/>
-          </a:ln>
-        </p:spPr>
-        <p:style>
-          <a:lnRef idx="1">
-            <a:schemeClr val="accent1"/>
-          </a:lnRef>
-          <a:fillRef idx="0">
-            <a:schemeClr val="accent1"/>
-          </a:fillRef>
-          <a:effectRef idx="0">
-            <a:schemeClr val="accent1"/>
-          </a:effectRef>
-          <a:fontRef idx="minor">
-            <a:schemeClr val="tx1"/>
-          </a:fontRef>
-        </p:style>
-      </p:cxnSp>
-      <p:cxnSp>
-        <p:nvCxnSpPr>
-          <p:cNvPr id="21" name="Straight Arrow Connector 20">
-            <a:extLst>
-              <a:ext uri="{FF2B5EF4-FFF2-40B4-BE49-F238E27FC236}">
-                <a16:creationId xmlns:a16="http://schemas.microsoft.com/office/drawing/2014/main" id="{78185F8A-ADDC-644A-9501-DFA81E13E633}"/>
-              </a:ext>
-            </a:extLst>
-          </p:cNvPr>
-          <p:cNvCxnSpPr>
-            <a:cxnSpLocks/>
-            <a:stCxn id="10" idx="1"/>
-            <a:endCxn id="8" idx="3"/>
-          </p:cNvCxnSpPr>
-          <p:nvPr/>
-        </p:nvCxnSpPr>
-        <p:spPr>
-          <a:xfrm flipH="1">
-            <a:off x="4902200" y="1865058"/>
-            <a:ext cx="2038118" cy="1374394"/>
-          </a:xfrm>
-          <a:prstGeom prst="straightConnector1">
-            <a:avLst/>
-          </a:prstGeom>
-          <a:ln w="38100">
-            <a:solidFill>
-              <a:srgbClr val="C00000"/>
-            </a:solidFill>
-            <a:headEnd type="triangle"/>
-            <a:tailEnd type="none"/>
-          </a:ln>
-        </p:spPr>
-        <p:style>
-          <a:lnRef idx="1">
-            <a:schemeClr val="accent1"/>
-          </a:lnRef>
-          <a:fillRef idx="0">
-            <a:schemeClr val="accent1"/>
-          </a:fillRef>
-          <a:effectRef idx="0">
-            <a:schemeClr val="accent1"/>
-          </a:effectRef>
-          <a:fontRef idx="minor">
-            <a:schemeClr val="tx1"/>
-          </a:fontRef>
-        </p:style>
-      </p:cxnSp>
-      <p:cxnSp>
-        <p:nvCxnSpPr>
-          <p:cNvPr id="22" name="Straight Arrow Connector 21">
-            <a:extLst>
-              <a:ext uri="{FF2B5EF4-FFF2-40B4-BE49-F238E27FC236}">
-                <a16:creationId xmlns:a16="http://schemas.microsoft.com/office/drawing/2014/main" id="{05C51561-8F54-3E4C-A5EB-6A7F2E4C4A46}"/>
-              </a:ext>
-            </a:extLst>
-          </p:cNvPr>
-          <p:cNvCxnSpPr>
-            <a:cxnSpLocks/>
-            <a:stCxn id="13" idx="1"/>
-            <a:endCxn id="8" idx="3"/>
-          </p:cNvCxnSpPr>
-          <p:nvPr/>
-        </p:nvCxnSpPr>
-        <p:spPr>
-          <a:xfrm flipH="1" flipV="1">
-            <a:off x="4902200" y="3239452"/>
-            <a:ext cx="2038118" cy="46495"/>
-          </a:xfrm>
-          <a:prstGeom prst="straightConnector1">
-            <a:avLst/>
-          </a:prstGeom>
-          <a:ln w="38100">
-            <a:solidFill>
-              <a:srgbClr val="C00000"/>
-            </a:solidFill>
-            <a:headEnd type="triangle"/>
-            <a:tailEnd type="none"/>
-          </a:ln>
-        </p:spPr>
-        <p:style>
-          <a:lnRef idx="1">
-            <a:schemeClr val="accent1"/>
-          </a:lnRef>
-          <a:fillRef idx="0">
-            <a:schemeClr val="accent1"/>
-          </a:fillRef>
-          <a:effectRef idx="0">
-            <a:schemeClr val="accent1"/>
-          </a:effectRef>
-          <a:fontRef idx="minor">
-            <a:schemeClr val="tx1"/>
-          </a:fontRef>
-        </p:style>
-      </p:cxnSp>
-      <p:cxnSp>
-        <p:nvCxnSpPr>
-          <p:cNvPr id="23" name="Straight Arrow Connector 22">
-            <a:extLst>
-              <a:ext uri="{FF2B5EF4-FFF2-40B4-BE49-F238E27FC236}">
-                <a16:creationId xmlns:a16="http://schemas.microsoft.com/office/drawing/2014/main" id="{9AA7B9A6-970F-AE41-9C6E-5D53F1EC935E}"/>
-              </a:ext>
-            </a:extLst>
-          </p:cNvPr>
-          <p:cNvCxnSpPr>
-            <a:cxnSpLocks/>
-            <a:stCxn id="18" idx="1"/>
-            <a:endCxn id="8" idx="3"/>
-          </p:cNvCxnSpPr>
-          <p:nvPr/>
-        </p:nvCxnSpPr>
-        <p:spPr>
-          <a:xfrm flipH="1" flipV="1">
-            <a:off x="4902200" y="3239452"/>
-            <a:ext cx="710736" cy="1431188"/>
-          </a:xfrm>
-          <a:prstGeom prst="straightConnector1">
-            <a:avLst/>
-          </a:prstGeom>
-          <a:ln w="38100">
-            <a:solidFill>
-              <a:srgbClr val="C00000"/>
-            </a:solidFill>
-            <a:headEnd type="triangle"/>
-            <a:tailEnd type="triangle"/>
-          </a:ln>
-        </p:spPr>
-        <p:style>
-          <a:lnRef idx="1">
-            <a:schemeClr val="accent1"/>
-          </a:lnRef>
-          <a:fillRef idx="0">
-            <a:schemeClr val="accent1"/>
-          </a:fillRef>
-          <a:effectRef idx="0">
-            <a:schemeClr val="accent1"/>
-          </a:effectRef>
-          <a:fontRef idx="minor">
-            <a:schemeClr val="tx1"/>
-          </a:fontRef>
-        </p:style>
-      </p:cxnSp>
-      <p:cxnSp>
-        <p:nvCxnSpPr>
-          <p:cNvPr id="24" name="Straight Arrow Connector 23">
-            <a:extLst>
-              <a:ext uri="{FF2B5EF4-FFF2-40B4-BE49-F238E27FC236}">
-                <a16:creationId xmlns:a16="http://schemas.microsoft.com/office/drawing/2014/main" id="{359A605D-0F09-A242-91C0-0A3C71DEDA15}"/>
-              </a:ext>
-            </a:extLst>
-          </p:cNvPr>
-          <p:cNvCxnSpPr>
-            <a:cxnSpLocks/>
-            <a:stCxn id="14" idx="1"/>
-            <a:endCxn id="8" idx="3"/>
-          </p:cNvCxnSpPr>
-          <p:nvPr/>
-        </p:nvCxnSpPr>
-        <p:spPr>
-          <a:xfrm flipH="1">
-            <a:off x="4902200" y="2599684"/>
-            <a:ext cx="710736" cy="639768"/>
-          </a:xfrm>
-          <a:prstGeom prst="straightConnector1">
-            <a:avLst/>
-          </a:prstGeom>
-          <a:ln w="38100">
-            <a:solidFill>
-              <a:srgbClr val="C00000"/>
-            </a:solidFill>
-            <a:headEnd type="triangle"/>
-            <a:tailEnd type="none"/>
-          </a:ln>
-        </p:spPr>
-        <p:style>
-          <a:lnRef idx="1">
-            <a:schemeClr val="accent1"/>
-          </a:lnRef>
-          <a:fillRef idx="0">
-            <a:schemeClr val="accent1"/>
-          </a:fillRef>
-          <a:effectRef idx="0">
-            <a:schemeClr val="accent1"/>
-          </a:effectRef>
-          <a:fontRef idx="minor">
-            <a:schemeClr val="tx1"/>
-          </a:fontRef>
-        </p:style>
-      </p:cxnSp>
-      <p:cxnSp>
-        <p:nvCxnSpPr>
-          <p:cNvPr id="25" name="Straight Arrow Connector 24">
-            <a:extLst>
-              <a:ext uri="{FF2B5EF4-FFF2-40B4-BE49-F238E27FC236}">
-                <a16:creationId xmlns:a16="http://schemas.microsoft.com/office/drawing/2014/main" id="{14B7BC3A-48D1-F542-8848-E138804EB344}"/>
-              </a:ext>
-            </a:extLst>
-          </p:cNvPr>
-          <p:cNvCxnSpPr>
-            <a:cxnSpLocks/>
-            <a:stCxn id="13" idx="2"/>
-            <a:endCxn id="18" idx="0"/>
-          </p:cNvCxnSpPr>
-          <p:nvPr/>
-        </p:nvCxnSpPr>
-        <p:spPr>
-          <a:xfrm flipH="1">
-            <a:off x="6183924" y="3528168"/>
-            <a:ext cx="1327382" cy="900251"/>
-          </a:xfrm>
-          <a:prstGeom prst="straightConnector1">
-            <a:avLst/>
-          </a:prstGeom>
-          <a:ln w="25400">
-            <a:solidFill>
-              <a:schemeClr val="tx1"/>
-            </a:solidFill>
-            <a:headEnd type="triangle"/>
-            <a:tailEnd type="triangle"/>
-          </a:ln>
-        </p:spPr>
-        <p:style>
-          <a:lnRef idx="1">
-            <a:schemeClr val="accent1"/>
-          </a:lnRef>
-          <a:fillRef idx="0">
-            <a:schemeClr val="accent1"/>
-          </a:fillRef>
-          <a:effectRef idx="0">
-            <a:schemeClr val="accent1"/>
-          </a:effectRef>
-          <a:fontRef idx="minor">
-            <a:schemeClr val="tx1"/>
-          </a:fontRef>
-        </p:style>
-      </p:cxnSp>
-      <p:cxnSp>
-        <p:nvCxnSpPr>
-          <p:cNvPr id="26" name="Straight Arrow Connector 25">
-            <a:extLst>
-              <a:ext uri="{FF2B5EF4-FFF2-40B4-BE49-F238E27FC236}">
-                <a16:creationId xmlns:a16="http://schemas.microsoft.com/office/drawing/2014/main" id="{2ECB8AA2-9A11-AC40-88A8-9E84D87E67EE}"/>
-              </a:ext>
-            </a:extLst>
-          </p:cNvPr>
-          <p:cNvCxnSpPr>
-            <a:cxnSpLocks/>
-            <a:stCxn id="17" idx="1"/>
-            <a:endCxn id="18" idx="3"/>
-          </p:cNvCxnSpPr>
-          <p:nvPr/>
-        </p:nvCxnSpPr>
-        <p:spPr>
-          <a:xfrm flipH="1">
-            <a:off x="6754912" y="4670640"/>
-            <a:ext cx="185406" cy="0"/>
-          </a:xfrm>
-          <a:prstGeom prst="straightConnector1">
-            <a:avLst/>
-          </a:prstGeom>
-          <a:ln w="25400">
-            <a:solidFill>
-              <a:schemeClr val="tx1"/>
-            </a:solidFill>
-            <a:headEnd type="triangle"/>
-            <a:tailEnd type="triangle"/>
-          </a:ln>
-        </p:spPr>
-        <p:style>
-          <a:lnRef idx="1">
-            <a:schemeClr val="accent1"/>
-          </a:lnRef>
-          <a:fillRef idx="0">
-            <a:schemeClr val="accent1"/>
-          </a:fillRef>
-          <a:effectRef idx="0">
-            <a:schemeClr val="accent1"/>
-          </a:effectRef>
-          <a:fontRef idx="minor">
-            <a:schemeClr val="tx1"/>
-          </a:fontRef>
-        </p:style>
-      </p:cxnSp>
-      <p:cxnSp>
-        <p:nvCxnSpPr>
-          <p:cNvPr id="27" name="Straight Arrow Connector 26">
-            <a:extLst>
-              <a:ext uri="{FF2B5EF4-FFF2-40B4-BE49-F238E27FC236}">
-                <a16:creationId xmlns:a16="http://schemas.microsoft.com/office/drawing/2014/main" id="{1F3B9434-0BE7-FD45-85D5-D4F31951667B}"/>
-              </a:ext>
-            </a:extLst>
-          </p:cNvPr>
-          <p:cNvCxnSpPr>
-            <a:cxnSpLocks/>
-            <a:stCxn id="16" idx="2"/>
-            <a:endCxn id="13" idx="0"/>
-          </p:cNvCxnSpPr>
-          <p:nvPr/>
-        </p:nvCxnSpPr>
-        <p:spPr>
-          <a:xfrm>
-            <a:off x="7511306" y="2817723"/>
-            <a:ext cx="0" cy="226003"/>
-          </a:xfrm>
-          <a:prstGeom prst="straightConnector1">
-            <a:avLst/>
-          </a:prstGeom>
-          <a:ln w="25400">
-            <a:solidFill>
-              <a:schemeClr val="tx1"/>
-            </a:solidFill>
-            <a:headEnd type="triangle"/>
-            <a:tailEnd type="triangle"/>
-          </a:ln>
-        </p:spPr>
-        <p:style>
-          <a:lnRef idx="1">
-            <a:schemeClr val="accent1"/>
-          </a:lnRef>
-          <a:fillRef idx="0">
-            <a:schemeClr val="accent1"/>
-          </a:fillRef>
-          <a:effectRef idx="0">
-            <a:schemeClr val="accent1"/>
-          </a:effectRef>
-          <a:fontRef idx="minor">
-            <a:schemeClr val="tx1"/>
-          </a:fontRef>
-        </p:style>
-      </p:cxnSp>
-      <p:cxnSp>
-        <p:nvCxnSpPr>
-          <p:cNvPr id="28" name="Straight Arrow Connector 27">
-            <a:extLst>
-              <a:ext uri="{FF2B5EF4-FFF2-40B4-BE49-F238E27FC236}">
-                <a16:creationId xmlns:a16="http://schemas.microsoft.com/office/drawing/2014/main" id="{9248FCC3-9DD9-0348-B70C-2B4836243540}"/>
-              </a:ext>
-            </a:extLst>
-          </p:cNvPr>
-          <p:cNvCxnSpPr>
-            <a:cxnSpLocks/>
-            <a:stCxn id="10" idx="2"/>
-            <a:endCxn id="16" idx="0"/>
-          </p:cNvCxnSpPr>
-          <p:nvPr/>
-        </p:nvCxnSpPr>
-        <p:spPr>
-          <a:xfrm>
-            <a:off x="7511306" y="2107279"/>
-            <a:ext cx="0" cy="226002"/>
-          </a:xfrm>
-          <a:prstGeom prst="straightConnector1">
-            <a:avLst/>
-          </a:prstGeom>
-          <a:ln w="25400">
-            <a:solidFill>
-              <a:schemeClr val="tx1"/>
-            </a:solidFill>
-            <a:headEnd type="none"/>
-            <a:tailEnd type="triangle"/>
-          </a:ln>
-        </p:spPr>
-        <p:style>
-          <a:lnRef idx="1">
-            <a:schemeClr val="accent1"/>
-          </a:lnRef>
-          <a:fillRef idx="0">
-            <a:schemeClr val="accent1"/>
-          </a:fillRef>
-          <a:effectRef idx="0">
-            <a:schemeClr val="accent1"/>
-          </a:effectRef>
-          <a:fontRef idx="minor">
-            <a:schemeClr val="tx1"/>
-          </a:fontRef>
-        </p:style>
-      </p:cxnSp>
-      <p:cxnSp>
-        <p:nvCxnSpPr>
-          <p:cNvPr id="29" name="Straight Arrow Connector 28">
-            <a:extLst>
-              <a:ext uri="{FF2B5EF4-FFF2-40B4-BE49-F238E27FC236}">
-                <a16:creationId xmlns:a16="http://schemas.microsoft.com/office/drawing/2014/main" id="{7858A516-AC7C-5141-A14B-1E0A99F82E08}"/>
-              </a:ext>
-            </a:extLst>
-          </p:cNvPr>
-          <p:cNvCxnSpPr>
-            <a:cxnSpLocks/>
-            <a:stCxn id="15" idx="2"/>
-            <a:endCxn id="16" idx="0"/>
-          </p:cNvCxnSpPr>
-          <p:nvPr/>
-        </p:nvCxnSpPr>
-        <p:spPr>
-          <a:xfrm>
-            <a:off x="6183924" y="2107279"/>
-            <a:ext cx="1327382" cy="226002"/>
-          </a:xfrm>
-          <a:prstGeom prst="straightConnector1">
-            <a:avLst/>
-          </a:prstGeom>
-          <a:ln w="25400">
-            <a:solidFill>
-              <a:schemeClr val="tx1"/>
-            </a:solidFill>
-            <a:headEnd type="none"/>
-            <a:tailEnd type="triangle"/>
-          </a:ln>
-        </p:spPr>
-        <p:style>
-          <a:lnRef idx="1">
-            <a:schemeClr val="accent1"/>
-          </a:lnRef>
-          <a:fillRef idx="0">
-            <a:schemeClr val="accent1"/>
-          </a:fillRef>
-          <a:effectRef idx="0">
-            <a:schemeClr val="accent1"/>
-          </a:effectRef>
-          <a:fontRef idx="minor">
-            <a:schemeClr val="tx1"/>
-          </a:fontRef>
-        </p:style>
-      </p:cxnSp>
-      <p:cxnSp>
-        <p:nvCxnSpPr>
-          <p:cNvPr id="30" name="Straight Arrow Connector 29">
-            <a:extLst>
-              <a:ext uri="{FF2B5EF4-FFF2-40B4-BE49-F238E27FC236}">
-                <a16:creationId xmlns:a16="http://schemas.microsoft.com/office/drawing/2014/main" id="{B6FA1A97-A904-AB4E-8312-CB6129620C18}"/>
-              </a:ext>
-            </a:extLst>
-          </p:cNvPr>
-          <p:cNvCxnSpPr>
-            <a:cxnSpLocks/>
-            <a:stCxn id="14" idx="3"/>
-            <a:endCxn id="16" idx="1"/>
-          </p:cNvCxnSpPr>
-          <p:nvPr/>
-        </p:nvCxnSpPr>
-        <p:spPr>
-          <a:xfrm flipV="1">
-            <a:off x="6754912" y="2575502"/>
-            <a:ext cx="185406" cy="24182"/>
-          </a:xfrm>
-          <a:prstGeom prst="straightConnector1">
-            <a:avLst/>
-          </a:prstGeom>
-          <a:ln w="25400">
-            <a:solidFill>
-              <a:schemeClr val="tx1"/>
-            </a:solidFill>
-            <a:headEnd type="none"/>
-            <a:tailEnd type="triangle"/>
-          </a:ln>
-        </p:spPr>
-        <p:style>
-          <a:lnRef idx="1">
-            <a:schemeClr val="accent1"/>
-          </a:lnRef>
-          <a:fillRef idx="0">
-            <a:schemeClr val="accent1"/>
-          </a:fillRef>
-          <a:effectRef idx="0">
-            <a:schemeClr val="accent1"/>
-          </a:effectRef>
-          <a:fontRef idx="minor">
-            <a:schemeClr val="tx1"/>
-          </a:fontRef>
-        </p:style>
-      </p:cxnSp>
-      <p:pic>
-        <p:nvPicPr>
-          <p:cNvPr id="31" name="Picture 30">
-            <a:extLst>
-              <a:ext uri="{FF2B5EF4-FFF2-40B4-BE49-F238E27FC236}">
-                <a16:creationId xmlns:a16="http://schemas.microsoft.com/office/drawing/2014/main" id="{6856AFA0-F008-0A42-8F15-848066F3550E}"/>
-              </a:ext>
-            </a:extLst>
-          </p:cNvPr>
-          <p:cNvPicPr>
-            <a:picLocks noChangeAspect="1"/>
-          </p:cNvPicPr>
-          <p:nvPr/>
-        </p:nvPicPr>
-        <p:blipFill>
-          <a:blip r:embed="rId3"/>
-          <a:stretch>
-            <a:fillRect/>
-          </a:stretch>
-        </p:blipFill>
-        <p:spPr>
-          <a:xfrm>
-            <a:off x="5805727" y="3243110"/>
-            <a:ext cx="756394" cy="874274"/>
-          </a:xfrm>
-          <a:prstGeom prst="rect">
-            <a:avLst/>
-          </a:prstGeom>
-        </p:spPr>
-      </p:pic>
-      <p:pic>
-        <p:nvPicPr>
-          <p:cNvPr id="32" name="Picture 31">
-            <a:extLst>
-              <a:ext uri="{FF2B5EF4-FFF2-40B4-BE49-F238E27FC236}">
-                <a16:creationId xmlns:a16="http://schemas.microsoft.com/office/drawing/2014/main" id="{220E199D-D768-6A45-BF58-865C42EA8BDD}"/>
-              </a:ext>
-            </a:extLst>
-          </p:cNvPr>
-          <p:cNvPicPr>
-            <a:picLocks noChangeAspect="1"/>
-          </p:cNvPicPr>
-          <p:nvPr/>
-        </p:nvPicPr>
-        <p:blipFill>
-          <a:blip r:embed="rId3"/>
-          <a:stretch>
-            <a:fillRect/>
-          </a:stretch>
-        </p:blipFill>
-        <p:spPr>
-          <a:xfrm>
-            <a:off x="8078626" y="1808692"/>
-            <a:ext cx="756394" cy="874274"/>
-          </a:xfrm>
-          <a:prstGeom prst="rect">
-            <a:avLst/>
-          </a:prstGeom>
-        </p:spPr>
-      </p:pic>
-      <p:pic>
-        <p:nvPicPr>
-          <p:cNvPr id="33" name="Picture 32">
-            <a:extLst>
-              <a:ext uri="{FF2B5EF4-FFF2-40B4-BE49-F238E27FC236}">
-                <a16:creationId xmlns:a16="http://schemas.microsoft.com/office/drawing/2014/main" id="{11F2899F-FFC4-114A-BA52-39ABE79742DD}"/>
-              </a:ext>
-            </a:extLst>
-          </p:cNvPr>
-          <p:cNvPicPr>
-            <a:picLocks noChangeAspect="1"/>
-          </p:cNvPicPr>
-          <p:nvPr/>
-        </p:nvPicPr>
-        <p:blipFill>
-          <a:blip r:embed="rId3"/>
-          <a:stretch>
-            <a:fillRect/>
-          </a:stretch>
-        </p:blipFill>
-        <p:spPr>
-          <a:xfrm>
-            <a:off x="8066839" y="4666348"/>
-            <a:ext cx="756394" cy="874274"/>
-          </a:xfrm>
-          <a:prstGeom prst="rect">
-            <a:avLst/>
-          </a:prstGeom>
-        </p:spPr>
-      </p:pic>
-      <p:pic>
-        <p:nvPicPr>
-          <p:cNvPr id="34" name="Picture 33">
-            <a:extLst>
-              <a:ext uri="{FF2B5EF4-FFF2-40B4-BE49-F238E27FC236}">
-                <a16:creationId xmlns:a16="http://schemas.microsoft.com/office/drawing/2014/main" id="{21139739-5E32-434C-8C9D-617604F78663}"/>
-              </a:ext>
-            </a:extLst>
-          </p:cNvPr>
-          <p:cNvPicPr>
-            <a:picLocks noChangeAspect="1"/>
-          </p:cNvPicPr>
-          <p:nvPr/>
-        </p:nvPicPr>
-        <p:blipFill>
-          <a:blip r:embed="rId3"/>
-          <a:stretch>
-            <a:fillRect/>
-          </a:stretch>
-        </p:blipFill>
-        <p:spPr>
-          <a:xfrm flipH="1">
-            <a:off x="2085188" y="3142044"/>
-            <a:ext cx="756394" cy="874274"/>
-          </a:xfrm>
-          <a:prstGeom prst="rect">
-            <a:avLst/>
-          </a:prstGeom>
-        </p:spPr>
-      </p:pic>
     </p:spTree>
     <p:extLst>
       <p:ext uri="{BB962C8B-B14F-4D97-AF65-F5344CB8AC3E}">
-        <p14:creationId xmlns:p14="http://schemas.microsoft.com/office/powerpoint/2010/main" val="1261190982"/>
-      </p:ext>
-    </p:extLst>
-  </p:cSld>
-  <p:clrMapOvr>
-    <a:masterClrMapping/>
-  </p:clrMapOvr>
-</p:sld>
-</file>
-
-<file path=ppt/slides/slide2.xml><?xml version="1.0" encoding="utf-8"?>
-<p:sld xmlns:a="http://schemas.openxmlformats.org/drawingml/2006/main" xmlns:r="http://schemas.openxmlformats.org/officeDocument/2006/relationships" xmlns:p="http://schemas.openxmlformats.org/presentationml/2006/main">
-  <p:cSld>
-    <p:spTree>
-      <p:nvGrpSpPr>
-        <p:cNvPr id="1" name=""/>
-        <p:cNvGrpSpPr/>
-        <p:nvPr/>
-      </p:nvGrpSpPr>
-      <p:grpSpPr>
-        <a:xfrm>
-          <a:off x="0" y="0"/>
-          <a:ext cx="0" cy="0"/>
-          <a:chOff x="0" y="0"/>
-          <a:chExt cx="0" cy="0"/>
-        </a:xfrm>
-      </p:grpSpPr>
-      <p:sp>
-        <p:nvSpPr>
-          <p:cNvPr id="253" name="Rectangle 252">
-            <a:extLst>
-              <a:ext uri="{FF2B5EF4-FFF2-40B4-BE49-F238E27FC236}">
-                <a16:creationId xmlns:a16="http://schemas.microsoft.com/office/drawing/2014/main" id="{D32DF595-263A-E14F-AD1F-7EF20B777B6C}"/>
-              </a:ext>
-            </a:extLst>
-          </p:cNvPr>
-          <p:cNvSpPr/>
-          <p:nvPr/>
-        </p:nvSpPr>
-        <p:spPr>
-          <a:xfrm>
-            <a:off x="86179" y="121518"/>
-            <a:ext cx="11656291" cy="523220"/>
-          </a:xfrm>
-          <a:prstGeom prst="rect">
-            <a:avLst/>
-          </a:prstGeom>
-        </p:spPr>
-        <p:txBody>
-          <a:bodyPr wrap="square">
-            <a:spAutoFit/>
-          </a:bodyPr>
-          <a:lstStyle/>
-          <a:p>
-            <a:r>
-              <a:rPr lang="en-US" sz="2800" b="1" dirty="0"/>
-              <a:t>Abstraction of Deep Learning Accelerators</a:t>
-            </a:r>
-          </a:p>
-        </p:txBody>
-      </p:sp>
-      <p:sp>
-        <p:nvSpPr>
-          <p:cNvPr id="71" name="TextBox 70">
-            <a:extLst>
-              <a:ext uri="{FF2B5EF4-FFF2-40B4-BE49-F238E27FC236}">
-                <a16:creationId xmlns:a16="http://schemas.microsoft.com/office/drawing/2014/main" id="{E72A4E69-D05A-8B48-89BD-BC8FDD578ABF}"/>
-              </a:ext>
-            </a:extLst>
-          </p:cNvPr>
-          <p:cNvSpPr txBox="1"/>
-          <p:nvPr/>
-        </p:nvSpPr>
-        <p:spPr>
-          <a:xfrm>
-            <a:off x="1429472" y="5465868"/>
-            <a:ext cx="8969828" cy="830997"/>
-          </a:xfrm>
-          <a:prstGeom prst="rect">
-            <a:avLst/>
-          </a:prstGeom>
-          <a:noFill/>
-        </p:spPr>
-        <p:txBody>
-          <a:bodyPr wrap="none" rtlCol="0">
-            <a:spAutoFit/>
-          </a:bodyPr>
-          <a:lstStyle/>
-          <a:p>
-            <a:pPr algn="ctr"/>
-            <a:r>
-              <a:rPr lang="en-US" sz="2400" b="1" dirty="0">
-                <a:solidFill>
-                  <a:srgbClr val="4041FF"/>
-                </a:solidFill>
-              </a:rPr>
-              <a:t>Accelerators</a:t>
-            </a:r>
-            <a:r>
-              <a:rPr lang="en-US" sz="2400" dirty="0"/>
-              <a:t> are comprised of:</a:t>
-            </a:r>
-          </a:p>
-          <a:p>
-            <a:pPr algn="ctr"/>
-            <a:r>
-              <a:rPr lang="en-US" sz="2400" b="1" dirty="0">
-                <a:solidFill>
-                  <a:srgbClr val="00B050"/>
-                </a:solidFill>
-              </a:rPr>
-              <a:t>Compute</a:t>
-            </a:r>
-            <a:r>
-              <a:rPr lang="en-US" sz="2400" dirty="0">
-                <a:solidFill>
-                  <a:schemeClr val="bg1"/>
-                </a:solidFill>
-              </a:rPr>
-              <a:t>, </a:t>
-            </a:r>
-            <a:r>
-              <a:rPr lang="en-US" sz="2400" b="1" dirty="0">
-                <a:solidFill>
-                  <a:schemeClr val="bg1"/>
-                </a:solidFill>
-              </a:rPr>
-              <a:t>Storage</a:t>
-            </a:r>
-            <a:r>
-              <a:rPr lang="en-US" sz="2400" dirty="0">
-                <a:solidFill>
-                  <a:schemeClr val="bg1"/>
-                </a:solidFill>
-              </a:rPr>
-              <a:t>, </a:t>
-            </a:r>
-            <a:r>
-              <a:rPr lang="en-US" sz="2400" b="1" dirty="0">
-                <a:solidFill>
-                  <a:schemeClr val="bg1"/>
-                </a:solidFill>
-              </a:rPr>
-              <a:t>On-chip Communication</a:t>
-            </a:r>
-            <a:r>
-              <a:rPr lang="en-US" sz="2400" dirty="0">
-                <a:solidFill>
-                  <a:schemeClr val="bg1"/>
-                </a:solidFill>
-              </a:rPr>
-              <a:t>, </a:t>
-            </a:r>
-            <a:r>
-              <a:rPr lang="en-US" sz="2400" b="1" dirty="0">
-                <a:solidFill>
-                  <a:schemeClr val="bg1"/>
-                </a:solidFill>
-              </a:rPr>
-              <a:t>Off-chip Communication</a:t>
-            </a:r>
-          </a:p>
-        </p:txBody>
-      </p:sp>
-      <p:sp>
-        <p:nvSpPr>
-          <p:cNvPr id="5" name="Slide Number Placeholder 617">
-            <a:extLst>
-              <a:ext uri="{FF2B5EF4-FFF2-40B4-BE49-F238E27FC236}">
-                <a16:creationId xmlns:a16="http://schemas.microsoft.com/office/drawing/2014/main" id="{47B34421-9C14-8A4E-A6D1-59139A248F3C}"/>
-              </a:ext>
-            </a:extLst>
-          </p:cNvPr>
-          <p:cNvSpPr>
-            <a:spLocks noGrp="1"/>
-          </p:cNvSpPr>
-          <p:nvPr>
-            <p:ph type="sldNum" sz="quarter" idx="12"/>
-          </p:nvPr>
-        </p:nvSpPr>
-        <p:spPr>
-          <a:xfrm>
-            <a:off x="9170435" y="6356350"/>
-            <a:ext cx="2743200" cy="365125"/>
-          </a:xfrm>
-        </p:spPr>
-        <p:txBody>
-          <a:bodyPr/>
-          <a:lstStyle/>
-          <a:p>
-            <a:fld id="{4C8C6190-CC26-854B-999A-5802CBDE89CB}" type="slidenum">
-              <a:rPr lang="en-US" smtClean="0"/>
-              <a:t>2</a:t>
-            </a:fld>
-            <a:endParaRPr lang="en-US" dirty="0"/>
-          </a:p>
-        </p:txBody>
-      </p:sp>
-      <p:sp>
-        <p:nvSpPr>
-          <p:cNvPr id="16" name="Rectangle 15">
-            <a:extLst>
-              <a:ext uri="{FF2B5EF4-FFF2-40B4-BE49-F238E27FC236}">
-                <a16:creationId xmlns:a16="http://schemas.microsoft.com/office/drawing/2014/main" id="{00E07FFA-60FB-3548-B882-1562B4E01B16}"/>
-              </a:ext>
-            </a:extLst>
-          </p:cNvPr>
-          <p:cNvSpPr/>
-          <p:nvPr/>
-        </p:nvSpPr>
-        <p:spPr>
-          <a:xfrm>
-            <a:off x="6940318" y="2333281"/>
-            <a:ext cx="1141976" cy="484442"/>
-          </a:xfrm>
-          <a:prstGeom prst="rect">
-            <a:avLst/>
-          </a:prstGeom>
-          <a:solidFill>
-            <a:srgbClr val="B69BF2"/>
-          </a:solidFill>
-          <a:ln w="38100">
-            <a:solidFill>
-              <a:schemeClr val="tx1"/>
-            </a:solidFill>
-          </a:ln>
-        </p:spPr>
-        <p:style>
-          <a:lnRef idx="2">
-            <a:schemeClr val="accent1">
-              <a:shade val="50000"/>
-            </a:schemeClr>
-          </a:lnRef>
-          <a:fillRef idx="1">
-            <a:schemeClr val="accent1"/>
-          </a:fillRef>
-          <a:effectRef idx="0">
-            <a:schemeClr val="accent1"/>
-          </a:effectRef>
-          <a:fontRef idx="minor">
-            <a:schemeClr val="lt1"/>
-          </a:fontRef>
-        </p:style>
-        <p:txBody>
-          <a:bodyPr rtlCol="0" anchor="ctr"/>
-          <a:lstStyle/>
-          <a:p>
-            <a:pPr algn="ctr"/>
-            <a:r>
-              <a:rPr lang="en-US" b="1" dirty="0">
-                <a:solidFill>
-                  <a:schemeClr val="tx1"/>
-                </a:solidFill>
-              </a:rPr>
-              <a:t>PE Array</a:t>
-            </a:r>
-          </a:p>
-        </p:txBody>
-      </p:sp>
-      <p:sp>
-        <p:nvSpPr>
-          <p:cNvPr id="17" name="Rectangle 16">
-            <a:extLst>
-              <a:ext uri="{FF2B5EF4-FFF2-40B4-BE49-F238E27FC236}">
-                <a16:creationId xmlns:a16="http://schemas.microsoft.com/office/drawing/2014/main" id="{2A222752-CFE9-1145-83F6-AE412DCED445}"/>
-              </a:ext>
-            </a:extLst>
-          </p:cNvPr>
-          <p:cNvSpPr/>
-          <p:nvPr/>
-        </p:nvSpPr>
-        <p:spPr>
-          <a:xfrm>
-            <a:off x="6940318" y="4428419"/>
-            <a:ext cx="1141976" cy="484442"/>
-          </a:xfrm>
-          <a:prstGeom prst="rect">
-            <a:avLst/>
-          </a:prstGeom>
-          <a:solidFill>
-            <a:srgbClr val="B69BF2"/>
-          </a:solidFill>
-          <a:ln w="38100">
-            <a:solidFill>
-              <a:schemeClr val="tx1"/>
-            </a:solidFill>
-          </a:ln>
-        </p:spPr>
-        <p:style>
-          <a:lnRef idx="2">
-            <a:schemeClr val="accent1">
-              <a:shade val="50000"/>
-            </a:schemeClr>
-          </a:lnRef>
-          <a:fillRef idx="1">
-            <a:schemeClr val="accent1"/>
-          </a:fillRef>
-          <a:effectRef idx="0">
-            <a:schemeClr val="accent1"/>
-          </a:effectRef>
-          <a:fontRef idx="minor">
-            <a:schemeClr val="lt1"/>
-          </a:fontRef>
-        </p:style>
-        <p:txBody>
-          <a:bodyPr rtlCol="0" anchor="ctr"/>
-          <a:lstStyle/>
-          <a:p>
-            <a:pPr algn="ctr"/>
-            <a:r>
-              <a:rPr lang="en-US" b="1" dirty="0">
-                <a:solidFill>
-                  <a:schemeClr val="tx1"/>
-                </a:solidFill>
-              </a:rPr>
-              <a:t>ALU Array</a:t>
-            </a:r>
-          </a:p>
-        </p:txBody>
-      </p:sp>
-    </p:spTree>
-    <p:extLst>
-      <p:ext uri="{BB962C8B-B14F-4D97-AF65-F5344CB8AC3E}">
-        <p14:creationId xmlns:p14="http://schemas.microsoft.com/office/powerpoint/2010/main" val="1884148834"/>
+        <p14:creationId xmlns:p14="http://schemas.microsoft.com/office/powerpoint/2010/main" val="1615749246"/>
       </p:ext>
     </p:extLst>
   </p:cSld>
@@ -16138,7 +14524,7 @@
     </p:spTree>
     <p:extLst>
       <p:ext uri="{BB962C8B-B14F-4D97-AF65-F5344CB8AC3E}">
-        <p14:creationId xmlns:p14="http://schemas.microsoft.com/office/powerpoint/2010/main" val="1269896280"/>
+        <p14:creationId xmlns:p14="http://schemas.microsoft.com/office/powerpoint/2010/main" val="1487208373"/>
       </p:ext>
     </p:extLst>
   </p:cSld>
@@ -17119,7 +15505,7 @@
     </p:spTree>
     <p:extLst>
       <p:ext uri="{BB962C8B-B14F-4D97-AF65-F5344CB8AC3E}">
-        <p14:creationId xmlns:p14="http://schemas.microsoft.com/office/powerpoint/2010/main" val="2630355754"/>
+        <p14:creationId xmlns:p14="http://schemas.microsoft.com/office/powerpoint/2010/main" val="4271292215"/>
       </p:ext>
     </p:extLst>
   </p:cSld>
@@ -18449,7 +16835,7 @@
     </p:spTree>
     <p:extLst>
       <p:ext uri="{BB962C8B-B14F-4D97-AF65-F5344CB8AC3E}">
-        <p14:creationId xmlns:p14="http://schemas.microsoft.com/office/powerpoint/2010/main" val="2021259337"/>
+        <p14:creationId xmlns:p14="http://schemas.microsoft.com/office/powerpoint/2010/main" val="1866961888"/>
       </p:ext>
     </p:extLst>
   </p:cSld>
@@ -19919,7 +18305,7 @@
     </p:spTree>
     <p:extLst>
       <p:ext uri="{BB962C8B-B14F-4D97-AF65-F5344CB8AC3E}">
-        <p14:creationId xmlns:p14="http://schemas.microsoft.com/office/powerpoint/2010/main" val="113176673"/>
+        <p14:creationId xmlns:p14="http://schemas.microsoft.com/office/powerpoint/2010/main" val="1149423176"/>
       </p:ext>
     </p:extLst>
   </p:cSld>
@@ -21559,7 +19945,7 @@
     </p:spTree>
     <p:extLst>
       <p:ext uri="{BB962C8B-B14F-4D97-AF65-F5344CB8AC3E}">
-        <p14:creationId xmlns:p14="http://schemas.microsoft.com/office/powerpoint/2010/main" val="4004576906"/>
+        <p14:creationId xmlns:p14="http://schemas.microsoft.com/office/powerpoint/2010/main" val="913925018"/>
       </p:ext>
     </p:extLst>
   </p:cSld>
@@ -21741,7 +20127,7 @@
     </p:spTree>
     <p:extLst>
       <p:ext uri="{BB962C8B-B14F-4D97-AF65-F5344CB8AC3E}">
-        <p14:creationId xmlns:p14="http://schemas.microsoft.com/office/powerpoint/2010/main" val="2058124314"/>
+        <p14:creationId xmlns:p14="http://schemas.microsoft.com/office/powerpoint/2010/main" val="1358238128"/>
       </p:ext>
     </p:extLst>
   </p:cSld>
@@ -23463,7 +21849,7 @@
     </p:spTree>
     <p:extLst>
       <p:ext uri="{BB962C8B-B14F-4D97-AF65-F5344CB8AC3E}">
-        <p14:creationId xmlns:p14="http://schemas.microsoft.com/office/powerpoint/2010/main" val="2909661282"/>
+        <p14:creationId xmlns:p14="http://schemas.microsoft.com/office/powerpoint/2010/main" val="1184833060"/>
       </p:ext>
     </p:extLst>
   </p:cSld>

</xml_diff>